<commit_message>
Updated Agenda slides to include ASP.NET 5 Preview
</commit_message>
<xml_diff>
--- a/Presentation/Build-and-deploy-ASPNET/Build-and-deploy-ASPNET.pptx
+++ b/Presentation/Build-and-deploy-ASPNET/Build-and-deploy-ASPNET.pptx
@@ -15,7 +15,7 @@
   </p:notesMasterIdLst>
   <p:sldIdLst>
     <p:sldId id="257" r:id="rId8"/>
-    <p:sldId id="269" r:id="rId9"/>
+    <p:sldId id="280" r:id="rId9"/>
     <p:sldId id="259" r:id="rId10"/>
     <p:sldId id="256" r:id="rId11"/>
     <p:sldId id="270" r:id="rId12"/>
@@ -214,7 +214,7 @@
           <a:p>
             <a:fld id="{0E990FE3-7537-4D15-A9F5-FDF1805FD5F8}" type="datetimeFigureOut">
               <a:rPr lang="en-US" smtClean="0"/>
-              <a:t>6/5/2015</a:t>
+              <a:t>10/12/2015</a:t>
             </a:fld>
             <a:endParaRPr lang="en-US"/>
           </a:p>
@@ -1023,10 +1023,34 @@
                 <a:tableStyleId>{5C22544A-7EE6-4342-B048-85BDC9FD1C3A}</a:tableStyleId>
               </a:tblPr>
               <a:tblGrid>
-                <a:gridCol w="2764105"/>
-                <a:gridCol w="2764105"/>
-                <a:gridCol w="2764105"/>
-                <a:gridCol w="2764105"/>
+                <a:gridCol w="2764105">
+                  <a:extLst>
+                    <a:ext uri="{9D8B030D-6E8A-4147-A177-3AD203B41FA5}">
+                      <a16:colId xmlns:a16="http://schemas.microsoft.com/office/drawing/2014/main" val="20000"/>
+                    </a:ext>
+                  </a:extLst>
+                </a:gridCol>
+                <a:gridCol w="2764105">
+                  <a:extLst>
+                    <a:ext uri="{9D8B030D-6E8A-4147-A177-3AD203B41FA5}">
+                      <a16:colId xmlns:a16="http://schemas.microsoft.com/office/drawing/2014/main" val="20001"/>
+                    </a:ext>
+                  </a:extLst>
+                </a:gridCol>
+                <a:gridCol w="2764105">
+                  <a:extLst>
+                    <a:ext uri="{9D8B030D-6E8A-4147-A177-3AD203B41FA5}">
+                      <a16:colId xmlns:a16="http://schemas.microsoft.com/office/drawing/2014/main" val="20002"/>
+                    </a:ext>
+                  </a:extLst>
+                </a:gridCol>
+                <a:gridCol w="2764105">
+                  <a:extLst>
+                    <a:ext uri="{9D8B030D-6E8A-4147-A177-3AD203B41FA5}">
+                      <a16:colId xmlns:a16="http://schemas.microsoft.com/office/drawing/2014/main" val="20003"/>
+                    </a:ext>
+                  </a:extLst>
+                </a:gridCol>
               </a:tblGrid>
               <a:tr h="644435">
                 <a:tc>
@@ -1201,6 +1225,11 @@
                     </a:lnBlToTr>
                   </a:tcPr>
                 </a:tc>
+                <a:extLst>
+                  <a:ext uri="{0D108BD9-81ED-4DB2-BD59-A6C34878D82A}">
+                    <a16:rowId xmlns:a16="http://schemas.microsoft.com/office/drawing/2014/main" val="10000"/>
+                  </a:ext>
+                </a:extLst>
               </a:tr>
               <a:tr h="1225319">
                 <a:tc>
@@ -1432,6 +1461,11 @@
                     </a:lnBlToTr>
                   </a:tcPr>
                 </a:tc>
+                <a:extLst>
+                  <a:ext uri="{0D108BD9-81ED-4DB2-BD59-A6C34878D82A}">
+                    <a16:rowId xmlns:a16="http://schemas.microsoft.com/office/drawing/2014/main" val="10001"/>
+                  </a:ext>
+                </a:extLst>
               </a:tr>
               <a:tr h="1225319">
                 <a:tc>
@@ -1682,6 +1716,11 @@
                     </a:lnBlToTr>
                   </a:tcPr>
                 </a:tc>
+                <a:extLst>
+                  <a:ext uri="{0D108BD9-81ED-4DB2-BD59-A6C34878D82A}">
+                    <a16:rowId xmlns:a16="http://schemas.microsoft.com/office/drawing/2014/main" val="10002"/>
+                  </a:ext>
+                </a:extLst>
               </a:tr>
               <a:tr h="1225319">
                 <a:tc>
@@ -1932,6 +1971,11 @@
                     </a:lnBlToTr>
                   </a:tcPr>
                 </a:tc>
+                <a:extLst>
+                  <a:ext uri="{0D108BD9-81ED-4DB2-BD59-A6C34878D82A}">
+                    <a16:rowId xmlns:a16="http://schemas.microsoft.com/office/drawing/2014/main" val="10003"/>
+                  </a:ext>
+                </a:extLst>
               </a:tr>
             </a:tbl>
           </a:graphicData>
@@ -3015,10 +3059,34 @@
                 <a:tableStyleId>{93296810-A885-4BE3-A3E7-6D5BEEA58F35}</a:tableStyleId>
               </a:tblPr>
               <a:tblGrid>
-                <a:gridCol w="2764105"/>
-                <a:gridCol w="2764105"/>
-                <a:gridCol w="2764105"/>
-                <a:gridCol w="2764105"/>
+                <a:gridCol w="2764105">
+                  <a:extLst>
+                    <a:ext uri="{9D8B030D-6E8A-4147-A177-3AD203B41FA5}">
+                      <a16:colId xmlns:a16="http://schemas.microsoft.com/office/drawing/2014/main" val="20000"/>
+                    </a:ext>
+                  </a:extLst>
+                </a:gridCol>
+                <a:gridCol w="2764105">
+                  <a:extLst>
+                    <a:ext uri="{9D8B030D-6E8A-4147-A177-3AD203B41FA5}">
+                      <a16:colId xmlns:a16="http://schemas.microsoft.com/office/drawing/2014/main" val="20001"/>
+                    </a:ext>
+                  </a:extLst>
+                </a:gridCol>
+                <a:gridCol w="2764105">
+                  <a:extLst>
+                    <a:ext uri="{9D8B030D-6E8A-4147-A177-3AD203B41FA5}">
+                      <a16:colId xmlns:a16="http://schemas.microsoft.com/office/drawing/2014/main" val="20002"/>
+                    </a:ext>
+                  </a:extLst>
+                </a:gridCol>
+                <a:gridCol w="2764105">
+                  <a:extLst>
+                    <a:ext uri="{9D8B030D-6E8A-4147-A177-3AD203B41FA5}">
+                      <a16:colId xmlns:a16="http://schemas.microsoft.com/office/drawing/2014/main" val="20003"/>
+                    </a:ext>
+                  </a:extLst>
+                </a:gridCol>
               </a:tblGrid>
               <a:tr h="644435">
                 <a:tc>
@@ -3177,6 +3245,11 @@
                     </a:lnBlToTr>
                   </a:tcPr>
                 </a:tc>
+                <a:extLst>
+                  <a:ext uri="{0D108BD9-81ED-4DB2-BD59-A6C34878D82A}">
+                    <a16:rowId xmlns:a16="http://schemas.microsoft.com/office/drawing/2014/main" val="10000"/>
+                  </a:ext>
+                </a:extLst>
               </a:tr>
               <a:tr h="1225319">
                 <a:tc>
@@ -3392,6 +3465,11 @@
                     </a:lnBlToTr>
                   </a:tcPr>
                 </a:tc>
+                <a:extLst>
+                  <a:ext uri="{0D108BD9-81ED-4DB2-BD59-A6C34878D82A}">
+                    <a16:rowId xmlns:a16="http://schemas.microsoft.com/office/drawing/2014/main" val="10001"/>
+                  </a:ext>
+                </a:extLst>
               </a:tr>
               <a:tr h="1225319">
                 <a:tc>
@@ -3626,6 +3704,11 @@
                     </a:lnBlToTr>
                   </a:tcPr>
                 </a:tc>
+                <a:extLst>
+                  <a:ext uri="{0D108BD9-81ED-4DB2-BD59-A6C34878D82A}">
+                    <a16:rowId xmlns:a16="http://schemas.microsoft.com/office/drawing/2014/main" val="10002"/>
+                  </a:ext>
+                </a:extLst>
               </a:tr>
               <a:tr h="1225319">
                 <a:tc>
@@ -3860,6 +3943,11 @@
                     </a:lnBlToTr>
                   </a:tcPr>
                 </a:tc>
+                <a:extLst>
+                  <a:ext uri="{0D108BD9-81ED-4DB2-BD59-A6C34878D82A}">
+                    <a16:rowId xmlns:a16="http://schemas.microsoft.com/office/drawing/2014/main" val="10003"/>
+                  </a:ext>
+                </a:extLst>
               </a:tr>
             </a:tbl>
           </a:graphicData>
@@ -5078,10 +5166,34 @@
                 <a:tableStyleId>{21E4AEA4-8DFA-4A89-87EB-49C32662AFE0}</a:tableStyleId>
               </a:tblPr>
               <a:tblGrid>
-                <a:gridCol w="2764105"/>
-                <a:gridCol w="2764105"/>
-                <a:gridCol w="2764105"/>
-                <a:gridCol w="2764105"/>
+                <a:gridCol w="2764105">
+                  <a:extLst>
+                    <a:ext uri="{9D8B030D-6E8A-4147-A177-3AD203B41FA5}">
+                      <a16:colId xmlns:a16="http://schemas.microsoft.com/office/drawing/2014/main" val="20000"/>
+                    </a:ext>
+                  </a:extLst>
+                </a:gridCol>
+                <a:gridCol w="2764105">
+                  <a:extLst>
+                    <a:ext uri="{9D8B030D-6E8A-4147-A177-3AD203B41FA5}">
+                      <a16:colId xmlns:a16="http://schemas.microsoft.com/office/drawing/2014/main" val="20001"/>
+                    </a:ext>
+                  </a:extLst>
+                </a:gridCol>
+                <a:gridCol w="2764105">
+                  <a:extLst>
+                    <a:ext uri="{9D8B030D-6E8A-4147-A177-3AD203B41FA5}">
+                      <a16:colId xmlns:a16="http://schemas.microsoft.com/office/drawing/2014/main" val="20002"/>
+                    </a:ext>
+                  </a:extLst>
+                </a:gridCol>
+                <a:gridCol w="2764105">
+                  <a:extLst>
+                    <a:ext uri="{9D8B030D-6E8A-4147-A177-3AD203B41FA5}">
+                      <a16:colId xmlns:a16="http://schemas.microsoft.com/office/drawing/2014/main" val="20003"/>
+                    </a:ext>
+                  </a:extLst>
+                </a:gridCol>
               </a:tblGrid>
               <a:tr h="644435">
                 <a:tc>
@@ -5252,6 +5364,11 @@
                     </a:solidFill>
                   </a:tcPr>
                 </a:tc>
+                <a:extLst>
+                  <a:ext uri="{0D108BD9-81ED-4DB2-BD59-A6C34878D82A}">
+                    <a16:rowId xmlns:a16="http://schemas.microsoft.com/office/drawing/2014/main" val="10000"/>
+                  </a:ext>
+                </a:extLst>
               </a:tr>
               <a:tr h="1225319">
                 <a:tc>
@@ -5479,6 +5596,11 @@
                     </a:solidFill>
                   </a:tcPr>
                 </a:tc>
+                <a:extLst>
+                  <a:ext uri="{0D108BD9-81ED-4DB2-BD59-A6C34878D82A}">
+                    <a16:rowId xmlns:a16="http://schemas.microsoft.com/office/drawing/2014/main" val="10001"/>
+                  </a:ext>
+                </a:extLst>
               </a:tr>
               <a:tr h="1225319">
                 <a:tc>
@@ -5733,6 +5855,11 @@
                     </a:solidFill>
                   </a:tcPr>
                 </a:tc>
+                <a:extLst>
+                  <a:ext uri="{0D108BD9-81ED-4DB2-BD59-A6C34878D82A}">
+                    <a16:rowId xmlns:a16="http://schemas.microsoft.com/office/drawing/2014/main" val="10002"/>
+                  </a:ext>
+                </a:extLst>
               </a:tr>
               <a:tr h="1225319">
                 <a:tc>
@@ -5979,6 +6106,11 @@
                     </a:solidFill>
                   </a:tcPr>
                 </a:tc>
+                <a:extLst>
+                  <a:ext uri="{0D108BD9-81ED-4DB2-BD59-A6C34878D82A}">
+                    <a16:rowId xmlns:a16="http://schemas.microsoft.com/office/drawing/2014/main" val="10003"/>
+                  </a:ext>
+                </a:extLst>
               </a:tr>
             </a:tbl>
           </a:graphicData>
@@ -7389,10 +7521,34 @@
                 <a:tableStyleId>{5C22544A-7EE6-4342-B048-85BDC9FD1C3A}</a:tableStyleId>
               </a:tblPr>
               <a:tblGrid>
-                <a:gridCol w="2764105"/>
-                <a:gridCol w="2764105"/>
-                <a:gridCol w="2764105"/>
-                <a:gridCol w="2764105"/>
+                <a:gridCol w="2764105">
+                  <a:extLst>
+                    <a:ext uri="{9D8B030D-6E8A-4147-A177-3AD203B41FA5}">
+                      <a16:colId xmlns:a16="http://schemas.microsoft.com/office/drawing/2014/main" val="20000"/>
+                    </a:ext>
+                  </a:extLst>
+                </a:gridCol>
+                <a:gridCol w="2764105">
+                  <a:extLst>
+                    <a:ext uri="{9D8B030D-6E8A-4147-A177-3AD203B41FA5}">
+                      <a16:colId xmlns:a16="http://schemas.microsoft.com/office/drawing/2014/main" val="20001"/>
+                    </a:ext>
+                  </a:extLst>
+                </a:gridCol>
+                <a:gridCol w="2764105">
+                  <a:extLst>
+                    <a:ext uri="{9D8B030D-6E8A-4147-A177-3AD203B41FA5}">
+                      <a16:colId xmlns:a16="http://schemas.microsoft.com/office/drawing/2014/main" val="20002"/>
+                    </a:ext>
+                  </a:extLst>
+                </a:gridCol>
+                <a:gridCol w="2764105">
+                  <a:extLst>
+                    <a:ext uri="{9D8B030D-6E8A-4147-A177-3AD203B41FA5}">
+                      <a16:colId xmlns:a16="http://schemas.microsoft.com/office/drawing/2014/main" val="20003"/>
+                    </a:ext>
+                  </a:extLst>
+                </a:gridCol>
               </a:tblGrid>
               <a:tr h="644435">
                 <a:tc>
@@ -7567,6 +7723,11 @@
                     </a:lnBlToTr>
                   </a:tcPr>
                 </a:tc>
+                <a:extLst>
+                  <a:ext uri="{0D108BD9-81ED-4DB2-BD59-A6C34878D82A}">
+                    <a16:rowId xmlns:a16="http://schemas.microsoft.com/office/drawing/2014/main" val="10000"/>
+                  </a:ext>
+                </a:extLst>
               </a:tr>
               <a:tr h="1225319">
                 <a:tc>
@@ -7798,6 +7959,11 @@
                     </a:lnBlToTr>
                   </a:tcPr>
                 </a:tc>
+                <a:extLst>
+                  <a:ext uri="{0D108BD9-81ED-4DB2-BD59-A6C34878D82A}">
+                    <a16:rowId xmlns:a16="http://schemas.microsoft.com/office/drawing/2014/main" val="10001"/>
+                  </a:ext>
+                </a:extLst>
               </a:tr>
               <a:tr h="1225319">
                 <a:tc>
@@ -8048,6 +8214,11 @@
                     </a:lnBlToTr>
                   </a:tcPr>
                 </a:tc>
+                <a:extLst>
+                  <a:ext uri="{0D108BD9-81ED-4DB2-BD59-A6C34878D82A}">
+                    <a16:rowId xmlns:a16="http://schemas.microsoft.com/office/drawing/2014/main" val="10002"/>
+                  </a:ext>
+                </a:extLst>
               </a:tr>
               <a:tr h="1225319">
                 <a:tc>
@@ -8298,6 +8469,11 @@
                     </a:lnBlToTr>
                   </a:tcPr>
                 </a:tc>
+                <a:extLst>
+                  <a:ext uri="{0D108BD9-81ED-4DB2-BD59-A6C34878D82A}">
+                    <a16:rowId xmlns:a16="http://schemas.microsoft.com/office/drawing/2014/main" val="10003"/>
+                  </a:ext>
+                </a:extLst>
               </a:tr>
             </a:tbl>
           </a:graphicData>
@@ -9510,10 +9686,34 @@
                 <a:tableStyleId>{5C22544A-7EE6-4342-B048-85BDC9FD1C3A}</a:tableStyleId>
               </a:tblPr>
               <a:tblGrid>
-                <a:gridCol w="2764105"/>
-                <a:gridCol w="2764105"/>
-                <a:gridCol w="2764105"/>
-                <a:gridCol w="2764105"/>
+                <a:gridCol w="2764105">
+                  <a:extLst>
+                    <a:ext uri="{9D8B030D-6E8A-4147-A177-3AD203B41FA5}">
+                      <a16:colId xmlns:a16="http://schemas.microsoft.com/office/drawing/2014/main" val="20000"/>
+                    </a:ext>
+                  </a:extLst>
+                </a:gridCol>
+                <a:gridCol w="2764105">
+                  <a:extLst>
+                    <a:ext uri="{9D8B030D-6E8A-4147-A177-3AD203B41FA5}">
+                      <a16:colId xmlns:a16="http://schemas.microsoft.com/office/drawing/2014/main" val="20001"/>
+                    </a:ext>
+                  </a:extLst>
+                </a:gridCol>
+                <a:gridCol w="2764105">
+                  <a:extLst>
+                    <a:ext uri="{9D8B030D-6E8A-4147-A177-3AD203B41FA5}">
+                      <a16:colId xmlns:a16="http://schemas.microsoft.com/office/drawing/2014/main" val="20002"/>
+                    </a:ext>
+                  </a:extLst>
+                </a:gridCol>
+                <a:gridCol w="2764105">
+                  <a:extLst>
+                    <a:ext uri="{9D8B030D-6E8A-4147-A177-3AD203B41FA5}">
+                      <a16:colId xmlns:a16="http://schemas.microsoft.com/office/drawing/2014/main" val="20003"/>
+                    </a:ext>
+                  </a:extLst>
+                </a:gridCol>
               </a:tblGrid>
               <a:tr h="644435">
                 <a:tc>
@@ -9688,6 +9888,11 @@
                     </a:lnBlToTr>
                   </a:tcPr>
                 </a:tc>
+                <a:extLst>
+                  <a:ext uri="{0D108BD9-81ED-4DB2-BD59-A6C34878D82A}">
+                    <a16:rowId xmlns:a16="http://schemas.microsoft.com/office/drawing/2014/main" val="10000"/>
+                  </a:ext>
+                </a:extLst>
               </a:tr>
               <a:tr h="1225319">
                 <a:tc>
@@ -9919,6 +10124,11 @@
                     </a:lnBlToTr>
                   </a:tcPr>
                 </a:tc>
+                <a:extLst>
+                  <a:ext uri="{0D108BD9-81ED-4DB2-BD59-A6C34878D82A}">
+                    <a16:rowId xmlns:a16="http://schemas.microsoft.com/office/drawing/2014/main" val="10001"/>
+                  </a:ext>
+                </a:extLst>
               </a:tr>
               <a:tr h="1225319">
                 <a:tc>
@@ -10169,6 +10379,11 @@
                     </a:lnBlToTr>
                   </a:tcPr>
                 </a:tc>
+                <a:extLst>
+                  <a:ext uri="{0D108BD9-81ED-4DB2-BD59-A6C34878D82A}">
+                    <a16:rowId xmlns:a16="http://schemas.microsoft.com/office/drawing/2014/main" val="10002"/>
+                  </a:ext>
+                </a:extLst>
               </a:tr>
               <a:tr h="1225319">
                 <a:tc>
@@ -10419,6 +10634,11 @@
                     </a:lnBlToTr>
                   </a:tcPr>
                 </a:tc>
+                <a:extLst>
+                  <a:ext uri="{0D108BD9-81ED-4DB2-BD59-A6C34878D82A}">
+                    <a16:rowId xmlns:a16="http://schemas.microsoft.com/office/drawing/2014/main" val="10003"/>
+                  </a:ext>
+                </a:extLst>
               </a:tr>
             </a:tbl>
           </a:graphicData>
@@ -18085,11 +18305,7 @@
           <a:p>
             <a:r>
               <a:rPr lang="en-US" dirty="0" smtClean="0"/>
-              <a:t>Deploying to Microsoft Azure Web </a:t>
-            </a:r>
-            <a:r>
-              <a:rPr lang="en-US" dirty="0" smtClean="0"/>
-              <a:t>Apps</a:t>
+              <a:t>Deploying to Microsoft Azure Web Apps</a:t>
             </a:r>
             <a:endParaRPr lang="en-US" dirty="0"/>
           </a:p>
@@ -18359,6 +18575,34 @@
       </p:grpSpPr>
       <p:sp>
         <p:nvSpPr>
+          <p:cNvPr id="2" name="Title 1"/>
+          <p:cNvSpPr>
+            <a:spLocks noGrp="1"/>
+          </p:cNvSpPr>
+          <p:nvPr>
+            <p:ph type="title"/>
+          </p:nvPr>
+        </p:nvSpPr>
+        <p:spPr>
+          <a:xfrm>
+            <a:off x="357188" y="-154968"/>
+            <a:ext cx="11079822" cy="1325563"/>
+          </a:xfrm>
+        </p:spPr>
+        <p:txBody>
+          <a:bodyPr/>
+          <a:lstStyle/>
+          <a:p>
+            <a:r>
+              <a:rPr lang="en-US" dirty="0" smtClean="0"/>
+              <a:t>Today’s Agenda</a:t>
+            </a:r>
+            <a:endParaRPr lang="en-US" dirty="0"/>
+          </a:p>
+        </p:txBody>
+      </p:sp>
+      <p:sp>
+        <p:nvSpPr>
           <p:cNvPr id="3" name="Content Placeholder 2"/>
           <p:cNvSpPr>
             <a:spLocks noGrp="1"/>
@@ -18372,6 +18616,29 @@
           <a:bodyPr/>
           <a:lstStyle/>
           <a:p>
+            <a:endParaRPr lang="en-US"/>
+          </a:p>
+        </p:txBody>
+      </p:sp>
+      <p:sp>
+        <p:nvSpPr>
+          <p:cNvPr id="4" name="Slide Number Placeholder 3"/>
+          <p:cNvSpPr>
+            <a:spLocks noGrp="1"/>
+          </p:cNvSpPr>
+          <p:nvPr>
+            <p:ph type="sldNum" sz="quarter" idx="12"/>
+          </p:nvPr>
+        </p:nvSpPr>
+        <p:spPr/>
+        <p:txBody>
+          <a:bodyPr/>
+          <a:lstStyle/>
+          <a:p>
+            <a:fld id="{0A164282-434E-41D4-9582-783D542A7B68}" type="slidenum">
+              <a:rPr lang="en-US" smtClean="0"/>
+              <a:t>2</a:t>
+            </a:fld>
             <a:endParaRPr lang="en-US"/>
           </a:p>
         </p:txBody>
@@ -18404,14 +18671,14 @@
           <p:nvPr>
             <p:extLst>
               <p:ext uri="{D42A27DB-BD31-4B8C-83A1-F6EECF244321}">
-                <p14:modId xmlns:p14="http://schemas.microsoft.com/office/powerpoint/2010/main" val="2017187027"/>
+                <p14:modId xmlns:p14="http://schemas.microsoft.com/office/powerpoint/2010/main" val="2979339217"/>
               </p:ext>
             </p:extLst>
           </p:nvPr>
         </p:nvGraphicFramePr>
         <p:xfrm>
           <a:off x="454816" y="1031200"/>
-          <a:ext cx="11483183" cy="5225016"/>
+          <a:ext cx="11483183" cy="5634204"/>
         </p:xfrm>
         <a:graphic>
           <a:graphicData uri="http://schemas.openxmlformats.org/drawingml/2006/table">
@@ -18420,9 +18687,27 @@
                 <a:tableStyleId>{6E25E649-3F16-4E02-A733-19D2CDBF48F0}</a:tableStyleId>
               </a:tblPr>
               <a:tblGrid>
-                <a:gridCol w="8350512"/>
-                <a:gridCol w="1662043"/>
-                <a:gridCol w="1470628"/>
+                <a:gridCol w="8350512">
+                  <a:extLst>
+                    <a:ext uri="{9D8B030D-6E8A-4147-A177-3AD203B41FA5}">
+                      <a16:colId xmlns:a16="http://schemas.microsoft.com/office/drawing/2014/main" val="20000"/>
+                    </a:ext>
+                  </a:extLst>
+                </a:gridCol>
+                <a:gridCol w="1662043">
+                  <a:extLst>
+                    <a:ext uri="{9D8B030D-6E8A-4147-A177-3AD203B41FA5}">
+                      <a16:colId xmlns:a16="http://schemas.microsoft.com/office/drawing/2014/main" val="20001"/>
+                    </a:ext>
+                  </a:extLst>
+                </a:gridCol>
+                <a:gridCol w="1470628">
+                  <a:extLst>
+                    <a:ext uri="{9D8B030D-6E8A-4147-A177-3AD203B41FA5}">
+                      <a16:colId xmlns:a16="http://schemas.microsoft.com/office/drawing/2014/main" val="20002"/>
+                    </a:ext>
+                  </a:extLst>
+                </a:gridCol>
               </a:tblGrid>
               <a:tr h="409188">
                 <a:tc>
@@ -18467,6 +18752,11 @@
                   </a:txBody>
                   <a:tcPr marL="45720" marR="45720"/>
                 </a:tc>
+                <a:extLst>
+                  <a:ext uri="{0D108BD9-81ED-4DB2-BD59-A6C34878D82A}">
+                    <a16:rowId xmlns:a16="http://schemas.microsoft.com/office/drawing/2014/main" val="10000"/>
+                  </a:ext>
+                </a:extLst>
               </a:tr>
               <a:tr h="409188">
                 <a:tc>
@@ -18475,10 +18765,103 @@
                     <a:lstStyle/>
                     <a:p>
                       <a:r>
-                        <a:rPr lang="en-US" sz="2000" dirty="0" smtClean="0"/>
+                        <a:rPr lang="en-US" sz="2000" dirty="0" smtClean="0">
+                          <a:solidFill>
+                            <a:srgbClr val="000000"/>
+                          </a:solidFill>
+                        </a:rPr>
                         <a:t>Keynote</a:t>
                       </a:r>
-                      <a:endParaRPr lang="en-US" sz="2000" dirty="0"/>
+                      <a:endParaRPr lang="en-US" sz="2000" dirty="0">
+                        <a:solidFill>
+                          <a:srgbClr val="000000"/>
+                        </a:solidFill>
+                      </a:endParaRPr>
+                    </a:p>
+                  </a:txBody>
+                  <a:tcPr marL="45720" marR="45720">
+                    <a:solidFill>
+                      <a:srgbClr val="E7E7E7"/>
+                    </a:solidFill>
+                  </a:tcPr>
+                </a:tc>
+                <a:tc>
+                  <a:txBody>
+                    <a:bodyPr/>
+                    <a:lstStyle/>
+                    <a:p>
+                      <a:r>
+                        <a:rPr lang="en-US" sz="2000" dirty="0" smtClean="0">
+                          <a:solidFill>
+                            <a:srgbClr val="000000"/>
+                          </a:solidFill>
+                        </a:rPr>
+                        <a:t>8:30</a:t>
+                      </a:r>
+                      <a:endParaRPr lang="en-US" sz="2000" dirty="0">
+                        <a:solidFill>
+                          <a:srgbClr val="000000"/>
+                        </a:solidFill>
+                      </a:endParaRPr>
+                    </a:p>
+                  </a:txBody>
+                  <a:tcPr marL="45720" marR="45720">
+                    <a:solidFill>
+                      <a:srgbClr val="E7E7E7"/>
+                    </a:solidFill>
+                  </a:tcPr>
+                </a:tc>
+                <a:tc>
+                  <a:txBody>
+                    <a:bodyPr/>
+                    <a:lstStyle/>
+                    <a:p>
+                      <a:r>
+                        <a:rPr lang="en-US" sz="2000" dirty="0" smtClean="0">
+                          <a:solidFill>
+                            <a:srgbClr val="000000"/>
+                          </a:solidFill>
+                        </a:rPr>
+                        <a:t>9:00</a:t>
+                      </a:r>
+                      <a:endParaRPr lang="en-US" sz="2000" dirty="0">
+                        <a:solidFill>
+                          <a:srgbClr val="000000"/>
+                        </a:solidFill>
+                      </a:endParaRPr>
+                    </a:p>
+                  </a:txBody>
+                  <a:tcPr marL="45720" marR="45720">
+                    <a:solidFill>
+                      <a:srgbClr val="E7E7E7"/>
+                    </a:solidFill>
+                  </a:tcPr>
+                </a:tc>
+                <a:extLst>
+                  <a:ext uri="{0D108BD9-81ED-4DB2-BD59-A6C34878D82A}">
+                    <a16:rowId xmlns:a16="http://schemas.microsoft.com/office/drawing/2014/main" val="10001"/>
+                  </a:ext>
+                </a:extLst>
+              </a:tr>
+              <a:tr h="409188">
+                <a:tc>
+                  <a:txBody>
+                    <a:bodyPr/>
+                    <a:lstStyle/>
+                    <a:p>
+                      <a:r>
+                        <a:rPr lang="en-US" sz="2000" dirty="0" smtClean="0">
+                          <a:solidFill>
+                            <a:srgbClr val="000000"/>
+                          </a:solidFill>
+                        </a:rPr>
+                        <a:t>Introduction to ASP.NET and Visual Studio 2015 Web Tools</a:t>
+                      </a:r>
+                      <a:endParaRPr lang="en-US" sz="2000" dirty="0">
+                        <a:solidFill>
+                          <a:srgbClr val="000000"/>
+                        </a:solidFill>
+                      </a:endParaRPr>
                     </a:p>
                   </a:txBody>
                   <a:tcPr marL="45720" marR="45720"/>
@@ -18489,10 +18872,18 @@
                     <a:lstStyle/>
                     <a:p>
                       <a:r>
-                        <a:rPr lang="en-US" sz="2000" dirty="0" smtClean="0"/>
-                        <a:t>8:30</a:t>
+                        <a:rPr lang="en-US" sz="2000" dirty="0" smtClean="0">
+                          <a:solidFill>
+                            <a:srgbClr val="000000"/>
+                          </a:solidFill>
+                        </a:rPr>
+                        <a:t>9:00</a:t>
                       </a:r>
-                      <a:endParaRPr lang="en-US" sz="2000" dirty="0"/>
+                      <a:endParaRPr lang="en-US" sz="2000" dirty="0">
+                        <a:solidFill>
+                          <a:srgbClr val="000000"/>
+                        </a:solidFill>
+                      </a:endParaRPr>
                     </a:p>
                   </a:txBody>
                   <a:tcPr marL="45720" marR="45720"/>
@@ -18503,14 +18894,27 @@
                     <a:lstStyle/>
                     <a:p>
                       <a:r>
-                        <a:rPr lang="en-US" sz="2000" dirty="0" smtClean="0"/>
-                        <a:t>9:00</a:t>
+                        <a:rPr lang="en-US" sz="2000" dirty="0" smtClean="0">
+                          <a:solidFill>
+                            <a:srgbClr val="000000"/>
+                          </a:solidFill>
+                        </a:rPr>
+                        <a:t>10:00</a:t>
                       </a:r>
-                      <a:endParaRPr lang="en-US" sz="2000" dirty="0"/>
+                      <a:endParaRPr lang="en-US" sz="2000" dirty="0">
+                        <a:solidFill>
+                          <a:srgbClr val="000000"/>
+                        </a:solidFill>
+                      </a:endParaRPr>
                     </a:p>
                   </a:txBody>
                   <a:tcPr marL="45720" marR="45720"/>
                 </a:tc>
+                <a:extLst>
+                  <a:ext uri="{0D108BD9-81ED-4DB2-BD59-A6C34878D82A}">
+                    <a16:rowId xmlns:a16="http://schemas.microsoft.com/office/drawing/2014/main" val="10002"/>
+                  </a:ext>
+                </a:extLst>
               </a:tr>
               <a:tr h="409188">
                 <a:tc>
@@ -18519,15 +18923,23 @@
                     <a:lstStyle/>
                     <a:p>
                       <a:r>
-                        <a:rPr lang="en-US" sz="2000" dirty="0" smtClean="0"/>
-                        <a:t>Introduction to ASP.NET and Visual Studio 2013 Web Tooling</a:t>
+                        <a:rPr lang="en-US" sz="2000" dirty="0" smtClean="0">
+                          <a:solidFill>
+                            <a:srgbClr val="000000"/>
+                          </a:solidFill>
+                        </a:rPr>
+                        <a:t>Building Web Applications using the latest ASP.NET technologies</a:t>
                       </a:r>
-                      <a:endParaRPr lang="en-US" sz="2000" dirty="0"/>
+                      <a:endParaRPr lang="en-US" sz="2000" dirty="0">
+                        <a:solidFill>
+                          <a:srgbClr val="000000"/>
+                        </a:solidFill>
+                      </a:endParaRPr>
                     </a:p>
                   </a:txBody>
                   <a:tcPr marL="45720" marR="45720">
                     <a:solidFill>
-                      <a:schemeClr val="bg1"/>
+                      <a:srgbClr val="FFC000"/>
                     </a:solidFill>
                   </a:tcPr>
                 </a:tc>
@@ -18537,15 +18949,23 @@
                     <a:lstStyle/>
                     <a:p>
                       <a:r>
-                        <a:rPr lang="en-US" sz="2000" dirty="0" smtClean="0"/>
-                        <a:t>9:00</a:t>
+                        <a:rPr lang="en-US" sz="2000" dirty="0" smtClean="0">
+                          <a:solidFill>
+                            <a:srgbClr val="000000"/>
+                          </a:solidFill>
+                        </a:rPr>
+                        <a:t>10:00</a:t>
                       </a:r>
-                      <a:endParaRPr lang="en-US" sz="2000" dirty="0"/>
+                      <a:endParaRPr lang="en-US" sz="2000" dirty="0">
+                        <a:solidFill>
+                          <a:srgbClr val="000000"/>
+                        </a:solidFill>
+                      </a:endParaRPr>
                     </a:p>
                   </a:txBody>
                   <a:tcPr marL="45720" marR="45720">
                     <a:solidFill>
-                      <a:schemeClr val="bg1"/>
+                      <a:srgbClr val="FFC000"/>
                     </a:solidFill>
                   </a:tcPr>
                 </a:tc>
@@ -18555,18 +18975,31 @@
                     <a:lstStyle/>
                     <a:p>
                       <a:r>
-                        <a:rPr lang="en-US" sz="2000" dirty="0" smtClean="0"/>
-                        <a:t>10:00</a:t>
+                        <a:rPr lang="en-US" sz="2000" dirty="0" smtClean="0">
+                          <a:solidFill>
+                            <a:srgbClr val="000000"/>
+                          </a:solidFill>
+                        </a:rPr>
+                        <a:t>11:00</a:t>
                       </a:r>
-                      <a:endParaRPr lang="en-US" sz="2000" dirty="0"/>
+                      <a:endParaRPr lang="en-US" sz="2000" dirty="0">
+                        <a:solidFill>
+                          <a:srgbClr val="000000"/>
+                        </a:solidFill>
+                      </a:endParaRPr>
                     </a:p>
                   </a:txBody>
                   <a:tcPr marL="45720" marR="45720">
                     <a:solidFill>
-                      <a:schemeClr val="bg1"/>
+                      <a:srgbClr val="FFC000"/>
                     </a:solidFill>
                   </a:tcPr>
                 </a:tc>
+                <a:extLst>
+                  <a:ext uri="{0D108BD9-81ED-4DB2-BD59-A6C34878D82A}">
+                    <a16:rowId xmlns:a16="http://schemas.microsoft.com/office/drawing/2014/main" val="10003"/>
+                  </a:ext>
+                </a:extLst>
               </a:tr>
               <a:tr h="409188">
                 <a:tc>
@@ -18575,66 +19008,18 @@
                     <a:lstStyle/>
                     <a:p>
                       <a:r>
-                        <a:rPr lang="en-US" sz="2000" dirty="0" smtClean="0"/>
-                        <a:t>Building Web Applications using the latest ASP.NET technologies</a:t>
-                      </a:r>
-                      <a:endParaRPr lang="en-US" sz="2000" dirty="0"/>
-                    </a:p>
-                  </a:txBody>
-                  <a:tcPr marL="45720" marR="45720">
-                    <a:solidFill>
-                      <a:schemeClr val="accent4"/>
-                    </a:solidFill>
-                  </a:tcPr>
-                </a:tc>
-                <a:tc>
-                  <a:txBody>
-                    <a:bodyPr/>
-                    <a:lstStyle/>
-                    <a:p>
-                      <a:r>
-                        <a:rPr lang="en-US" sz="2000" dirty="0" smtClean="0"/>
-                        <a:t>10:00</a:t>
-                      </a:r>
-                      <a:endParaRPr lang="en-US" sz="2000" dirty="0"/>
-                    </a:p>
-                  </a:txBody>
-                  <a:tcPr marL="45720" marR="45720">
-                    <a:solidFill>
-                      <a:schemeClr val="accent4"/>
-                    </a:solidFill>
-                  </a:tcPr>
-                </a:tc>
-                <a:tc>
-                  <a:txBody>
-                    <a:bodyPr/>
-                    <a:lstStyle/>
-                    <a:p>
-                      <a:r>
-                        <a:rPr lang="en-US" sz="2000" dirty="0" smtClean="0"/>
-                        <a:t>11:00</a:t>
-                      </a:r>
-                      <a:endParaRPr lang="en-US" sz="2000" dirty="0"/>
-                    </a:p>
-                  </a:txBody>
-                  <a:tcPr marL="45720" marR="45720">
-                    <a:solidFill>
-                      <a:schemeClr val="accent4"/>
-                    </a:solidFill>
-                  </a:tcPr>
-                </a:tc>
-              </a:tr>
-              <a:tr h="409188">
-                <a:tc>
-                  <a:txBody>
-                    <a:bodyPr/>
-                    <a:lstStyle/>
-                    <a:p>
-                      <a:r>
-                        <a:rPr lang="en-US" sz="2000" dirty="0" smtClean="0"/>
+                        <a:rPr lang="en-US" sz="2000" dirty="0" smtClean="0">
+                          <a:solidFill>
+                            <a:srgbClr val="000000"/>
+                          </a:solidFill>
+                        </a:rPr>
                         <a:t>Break</a:t>
                       </a:r>
-                      <a:endParaRPr lang="en-US" sz="2000" dirty="0"/>
+                      <a:endParaRPr lang="en-US" sz="2000" dirty="0">
+                        <a:solidFill>
+                          <a:srgbClr val="000000"/>
+                        </a:solidFill>
+                      </a:endParaRPr>
                     </a:p>
                   </a:txBody>
                   <a:tcPr marL="45720" marR="45720"/>
@@ -18645,10 +19030,18 @@
                     <a:lstStyle/>
                     <a:p>
                       <a:r>
-                        <a:rPr lang="en-US" sz="2000" dirty="0" smtClean="0"/>
+                        <a:rPr lang="en-US" sz="2000" dirty="0" smtClean="0">
+                          <a:solidFill>
+                            <a:srgbClr val="000000"/>
+                          </a:solidFill>
+                        </a:rPr>
                         <a:t>11:00</a:t>
                       </a:r>
-                      <a:endParaRPr lang="en-US" sz="2000" dirty="0"/>
+                      <a:endParaRPr lang="en-US" sz="2000" dirty="0">
+                        <a:solidFill>
+                          <a:srgbClr val="000000"/>
+                        </a:solidFill>
+                      </a:endParaRPr>
                     </a:p>
                   </a:txBody>
                   <a:tcPr marL="45720" marR="45720"/>
@@ -18659,14 +19052,27 @@
                     <a:lstStyle/>
                     <a:p>
                       <a:r>
-                        <a:rPr lang="en-US" sz="2000" dirty="0" smtClean="0"/>
+                        <a:rPr lang="en-US" sz="2000" dirty="0" smtClean="0">
+                          <a:solidFill>
+                            <a:srgbClr val="000000"/>
+                          </a:solidFill>
+                        </a:rPr>
                         <a:t>11:15</a:t>
                       </a:r>
-                      <a:endParaRPr lang="en-US" sz="2000" dirty="0"/>
+                      <a:endParaRPr lang="en-US" sz="2000" dirty="0">
+                        <a:solidFill>
+                          <a:srgbClr val="000000"/>
+                        </a:solidFill>
+                      </a:endParaRPr>
                     </a:p>
                   </a:txBody>
                   <a:tcPr marL="45720" marR="45720"/>
                 </a:tc>
+                <a:extLst>
+                  <a:ext uri="{0D108BD9-81ED-4DB2-BD59-A6C34878D82A}">
+                    <a16:rowId xmlns:a16="http://schemas.microsoft.com/office/drawing/2014/main" val="10004"/>
+                  </a:ext>
+                </a:extLst>
               </a:tr>
               <a:tr h="723948">
                 <a:tc>
@@ -18675,10 +19081,18 @@
                     <a:lstStyle/>
                     <a:p>
                       <a:r>
-                        <a:rPr lang="en-US" sz="2000" dirty="0" smtClean="0"/>
+                        <a:rPr lang="en-US" sz="2000" dirty="0" smtClean="0">
+                          <a:solidFill>
+                            <a:srgbClr val="000000"/>
+                          </a:solidFill>
+                        </a:rPr>
                         <a:t>Building web front ends for both desktop and mobile using the latest web standards</a:t>
                       </a:r>
-                      <a:endParaRPr lang="en-US" sz="2000" dirty="0"/>
+                      <a:endParaRPr lang="en-US" sz="2000" dirty="0">
+                        <a:solidFill>
+                          <a:srgbClr val="000000"/>
+                        </a:solidFill>
+                      </a:endParaRPr>
                     </a:p>
                   </a:txBody>
                   <a:tcPr marL="45720" marR="45720"/>
@@ -18689,10 +19103,18 @@
                     <a:lstStyle/>
                     <a:p>
                       <a:r>
-                        <a:rPr lang="en-US" sz="2000" dirty="0" smtClean="0"/>
+                        <a:rPr lang="en-US" sz="2000" dirty="0" smtClean="0">
+                          <a:solidFill>
+                            <a:srgbClr val="000000"/>
+                          </a:solidFill>
+                        </a:rPr>
                         <a:t>11:15</a:t>
                       </a:r>
-                      <a:endParaRPr lang="en-US" sz="2000" dirty="0"/>
+                      <a:endParaRPr lang="en-US" sz="2000" dirty="0">
+                        <a:solidFill>
+                          <a:srgbClr val="000000"/>
+                        </a:solidFill>
+                      </a:endParaRPr>
                     </a:p>
                   </a:txBody>
                   <a:tcPr marL="45720" marR="45720"/>
@@ -18703,14 +19125,27 @@
                     <a:lstStyle/>
                     <a:p>
                       <a:r>
-                        <a:rPr lang="en-US" sz="2000" dirty="0" smtClean="0"/>
+                        <a:rPr lang="en-US" sz="2000" dirty="0" smtClean="0">
+                          <a:solidFill>
+                            <a:srgbClr val="000000"/>
+                          </a:solidFill>
+                        </a:rPr>
                         <a:t>12:15</a:t>
                       </a:r>
-                      <a:endParaRPr lang="en-US" sz="2000" dirty="0"/>
+                      <a:endParaRPr lang="en-US" sz="2000" dirty="0">
+                        <a:solidFill>
+                          <a:srgbClr val="000000"/>
+                        </a:solidFill>
+                      </a:endParaRPr>
                     </a:p>
                   </a:txBody>
                   <a:tcPr marL="45720" marR="45720"/>
                 </a:tc>
+                <a:extLst>
+                  <a:ext uri="{0D108BD9-81ED-4DB2-BD59-A6C34878D82A}">
+                    <a16:rowId xmlns:a16="http://schemas.microsoft.com/office/drawing/2014/main" val="10005"/>
+                  </a:ext>
+                </a:extLst>
               </a:tr>
               <a:tr h="409188">
                 <a:tc>
@@ -18719,10 +19154,18 @@
                     <a:lstStyle/>
                     <a:p>
                       <a:r>
-                        <a:rPr lang="en-US" sz="2000" dirty="0" smtClean="0"/>
+                        <a:rPr lang="en-US" sz="2000" dirty="0" smtClean="0">
+                          <a:solidFill>
+                            <a:srgbClr val="000000"/>
+                          </a:solidFill>
+                        </a:rPr>
                         <a:t>Lunch</a:t>
                       </a:r>
-                      <a:endParaRPr lang="en-US" sz="2000" dirty="0"/>
+                      <a:endParaRPr lang="en-US" sz="2000" dirty="0">
+                        <a:solidFill>
+                          <a:srgbClr val="000000"/>
+                        </a:solidFill>
+                      </a:endParaRPr>
                     </a:p>
                   </a:txBody>
                   <a:tcPr marL="45720" marR="45720"/>
@@ -18733,10 +19176,18 @@
                     <a:lstStyle/>
                     <a:p>
                       <a:r>
-                        <a:rPr lang="en-US" sz="2000" dirty="0" smtClean="0"/>
+                        <a:rPr lang="en-US" sz="2000" dirty="0" smtClean="0">
+                          <a:solidFill>
+                            <a:srgbClr val="000000"/>
+                          </a:solidFill>
+                        </a:rPr>
                         <a:t>12:15</a:t>
                       </a:r>
-                      <a:endParaRPr lang="en-US" sz="2000" dirty="0"/>
+                      <a:endParaRPr lang="en-US" sz="2000" dirty="0">
+                        <a:solidFill>
+                          <a:srgbClr val="000000"/>
+                        </a:solidFill>
+                      </a:endParaRPr>
                     </a:p>
                   </a:txBody>
                   <a:tcPr marL="45720" marR="45720"/>
@@ -18747,14 +19198,27 @@
                     <a:lstStyle/>
                     <a:p>
                       <a:r>
-                        <a:rPr lang="en-US" sz="2000" dirty="0" smtClean="0"/>
+                        <a:rPr lang="en-US" sz="2000" dirty="0" smtClean="0">
+                          <a:solidFill>
+                            <a:srgbClr val="000000"/>
+                          </a:solidFill>
+                        </a:rPr>
                         <a:t>1:15</a:t>
                       </a:r>
-                      <a:endParaRPr lang="en-US" sz="2000" dirty="0"/>
+                      <a:endParaRPr lang="en-US" sz="2000" dirty="0">
+                        <a:solidFill>
+                          <a:srgbClr val="000000"/>
+                        </a:solidFill>
+                      </a:endParaRPr>
                     </a:p>
                   </a:txBody>
                   <a:tcPr marL="45720" marR="45720"/>
                 </a:tc>
+                <a:extLst>
+                  <a:ext uri="{0D108BD9-81ED-4DB2-BD59-A6C34878D82A}">
+                    <a16:rowId xmlns:a16="http://schemas.microsoft.com/office/drawing/2014/main" val="10006"/>
+                  </a:ext>
+                </a:extLst>
               </a:tr>
               <a:tr h="409188">
                 <a:tc>
@@ -18763,10 +19227,18 @@
                     <a:lstStyle/>
                     <a:p>
                       <a:r>
-                        <a:rPr lang="en-US" sz="2000" dirty="0" smtClean="0"/>
+                        <a:rPr lang="en-US" sz="2000" dirty="0" smtClean="0">
+                          <a:solidFill>
+                            <a:srgbClr val="000000"/>
+                          </a:solidFill>
+                        </a:rPr>
                         <a:t>API Services for both web and devices</a:t>
                       </a:r>
-                      <a:endParaRPr lang="en-US" sz="2000" dirty="0"/>
+                      <a:endParaRPr lang="en-US" sz="2000" dirty="0">
+                        <a:solidFill>
+                          <a:srgbClr val="000000"/>
+                        </a:solidFill>
+                      </a:endParaRPr>
                     </a:p>
                   </a:txBody>
                   <a:tcPr marL="45720" marR="45720"/>
@@ -18777,10 +19249,18 @@
                     <a:lstStyle/>
                     <a:p>
                       <a:r>
-                        <a:rPr lang="en-US" sz="2000" dirty="0" smtClean="0"/>
+                        <a:rPr lang="en-US" sz="2000" dirty="0" smtClean="0">
+                          <a:solidFill>
+                            <a:srgbClr val="000000"/>
+                          </a:solidFill>
+                        </a:rPr>
                         <a:t>1:15</a:t>
                       </a:r>
-                      <a:endParaRPr lang="en-US" sz="2000" dirty="0"/>
+                      <a:endParaRPr lang="en-US" sz="2000" dirty="0">
+                        <a:solidFill>
+                          <a:srgbClr val="000000"/>
+                        </a:solidFill>
+                      </a:endParaRPr>
                     </a:p>
                   </a:txBody>
                   <a:tcPr marL="45720" marR="45720"/>
@@ -18791,14 +19271,27 @@
                     <a:lstStyle/>
                     <a:p>
                       <a:r>
-                        <a:rPr lang="en-US" sz="2000" dirty="0" smtClean="0"/>
+                        <a:rPr lang="en-US" sz="2000" dirty="0" smtClean="0">
+                          <a:solidFill>
+                            <a:srgbClr val="000000"/>
+                          </a:solidFill>
+                        </a:rPr>
                         <a:t>2:15</a:t>
                       </a:r>
-                      <a:endParaRPr lang="en-US" sz="2000" dirty="0"/>
+                      <a:endParaRPr lang="en-US" sz="2000" dirty="0">
+                        <a:solidFill>
+                          <a:srgbClr val="000000"/>
+                        </a:solidFill>
+                      </a:endParaRPr>
                     </a:p>
                   </a:txBody>
                   <a:tcPr marL="45720" marR="45720"/>
                 </a:tc>
+                <a:extLst>
+                  <a:ext uri="{0D108BD9-81ED-4DB2-BD59-A6C34878D82A}">
+                    <a16:rowId xmlns:a16="http://schemas.microsoft.com/office/drawing/2014/main" val="10007"/>
+                  </a:ext>
+                </a:extLst>
               </a:tr>
               <a:tr h="409188">
                 <a:tc>
@@ -18807,10 +19300,18 @@
                     <a:lstStyle/>
                     <a:p>
                       <a:r>
-                        <a:rPr lang="en-US" sz="2000" dirty="0" smtClean="0"/>
+                        <a:rPr lang="en-US" sz="2000" dirty="0" smtClean="0">
+                          <a:solidFill>
+                            <a:srgbClr val="000000"/>
+                          </a:solidFill>
+                        </a:rPr>
                         <a:t>Running, improving and maintaining a site in the real world</a:t>
                       </a:r>
-                      <a:endParaRPr lang="en-US" sz="2000" dirty="0"/>
+                      <a:endParaRPr lang="en-US" sz="2000" dirty="0">
+                        <a:solidFill>
+                          <a:srgbClr val="000000"/>
+                        </a:solidFill>
+                      </a:endParaRPr>
                     </a:p>
                   </a:txBody>
                   <a:tcPr marL="45720" marR="45720"/>
@@ -18821,10 +19322,18 @@
                     <a:lstStyle/>
                     <a:p>
                       <a:r>
-                        <a:rPr lang="en-US" sz="2000" dirty="0" smtClean="0"/>
+                        <a:rPr lang="en-US" sz="2000" dirty="0" smtClean="0">
+                          <a:solidFill>
+                            <a:srgbClr val="000000"/>
+                          </a:solidFill>
+                        </a:rPr>
                         <a:t>2:15</a:t>
                       </a:r>
-                      <a:endParaRPr lang="en-US" sz="2000" dirty="0"/>
+                      <a:endParaRPr lang="en-US" sz="2000" dirty="0">
+                        <a:solidFill>
+                          <a:srgbClr val="000000"/>
+                        </a:solidFill>
+                      </a:endParaRPr>
                     </a:p>
                   </a:txBody>
                   <a:tcPr marL="45720" marR="45720"/>
@@ -18835,14 +19344,27 @@
                     <a:lstStyle/>
                     <a:p>
                       <a:r>
-                        <a:rPr lang="en-US" sz="2000" dirty="0" smtClean="0"/>
+                        <a:rPr lang="en-US" sz="2000" dirty="0" smtClean="0">
+                          <a:solidFill>
+                            <a:srgbClr val="000000"/>
+                          </a:solidFill>
+                        </a:rPr>
                         <a:t>3:15</a:t>
                       </a:r>
-                      <a:endParaRPr lang="en-US" sz="2000" dirty="0"/>
+                      <a:endParaRPr lang="en-US" sz="2000" dirty="0">
+                        <a:solidFill>
+                          <a:srgbClr val="000000"/>
+                        </a:solidFill>
+                      </a:endParaRPr>
                     </a:p>
                   </a:txBody>
                   <a:tcPr marL="45720" marR="45720"/>
                 </a:tc>
+                <a:extLst>
+                  <a:ext uri="{0D108BD9-81ED-4DB2-BD59-A6C34878D82A}">
+                    <a16:rowId xmlns:a16="http://schemas.microsoft.com/office/drawing/2014/main" val="10008"/>
+                  </a:ext>
+                </a:extLst>
               </a:tr>
               <a:tr h="409188">
                 <a:tc>
@@ -18851,10 +19373,18 @@
                     <a:lstStyle/>
                     <a:p>
                       <a:r>
-                        <a:rPr lang="en-US" sz="2000" dirty="0" smtClean="0"/>
+                        <a:rPr lang="en-US" sz="2000" dirty="0" smtClean="0">
+                          <a:solidFill>
+                            <a:srgbClr val="000000"/>
+                          </a:solidFill>
+                        </a:rPr>
                         <a:t>Break</a:t>
                       </a:r>
-                      <a:endParaRPr lang="en-US" sz="2000" dirty="0"/>
+                      <a:endParaRPr lang="en-US" sz="2000" dirty="0">
+                        <a:solidFill>
+                          <a:srgbClr val="000000"/>
+                        </a:solidFill>
+                      </a:endParaRPr>
                     </a:p>
                   </a:txBody>
                   <a:tcPr marL="45720" marR="45720"/>
@@ -18865,10 +19395,18 @@
                     <a:lstStyle/>
                     <a:p>
                       <a:r>
-                        <a:rPr lang="en-US" sz="2000" dirty="0" smtClean="0"/>
+                        <a:rPr lang="en-US" sz="2000" dirty="0" smtClean="0">
+                          <a:solidFill>
+                            <a:srgbClr val="000000"/>
+                          </a:solidFill>
+                        </a:rPr>
                         <a:t>3:15</a:t>
                       </a:r>
-                      <a:endParaRPr lang="en-US" sz="2000" dirty="0"/>
+                      <a:endParaRPr lang="en-US" sz="2000" dirty="0">
+                        <a:solidFill>
+                          <a:srgbClr val="000000"/>
+                        </a:solidFill>
+                      </a:endParaRPr>
                     </a:p>
                   </a:txBody>
                   <a:tcPr marL="45720" marR="45720"/>
@@ -18879,14 +19417,27 @@
                     <a:lstStyle/>
                     <a:p>
                       <a:r>
-                        <a:rPr lang="en-US" sz="2000" dirty="0" smtClean="0"/>
+                        <a:rPr lang="en-US" sz="2000" dirty="0" smtClean="0">
+                          <a:solidFill>
+                            <a:srgbClr val="000000"/>
+                          </a:solidFill>
+                        </a:rPr>
                         <a:t>3:30</a:t>
                       </a:r>
-                      <a:endParaRPr lang="en-US" sz="2000" dirty="0"/>
+                      <a:endParaRPr lang="en-US" sz="2000" dirty="0">
+                        <a:solidFill>
+                          <a:srgbClr val="000000"/>
+                        </a:solidFill>
+                      </a:endParaRPr>
                     </a:p>
                   </a:txBody>
                   <a:tcPr marL="45720" marR="45720"/>
                 </a:tc>
+                <a:extLst>
+                  <a:ext uri="{0D108BD9-81ED-4DB2-BD59-A6C34878D82A}">
+                    <a16:rowId xmlns:a16="http://schemas.microsoft.com/office/drawing/2014/main" val="10009"/>
+                  </a:ext>
+                </a:extLst>
               </a:tr>
               <a:tr h="409188">
                 <a:tc>
@@ -18895,18 +19446,29 @@
                     <a:lstStyle/>
                     <a:p>
                       <a:r>
-                        <a:rPr lang="en-US" sz="2000" dirty="0" smtClean="0"/>
+                        <a:rPr lang="en-US" sz="2000" dirty="0" smtClean="0">
+                          <a:solidFill>
+                            <a:srgbClr val="000000"/>
+                          </a:solidFill>
+                        </a:rPr>
                         <a:t>Real-time Communications</a:t>
                       </a:r>
                       <a:r>
-                        <a:rPr lang="en-US" sz="2000" baseline="0" dirty="0" smtClean="0"/>
+                        <a:rPr lang="en-US" sz="2000" baseline="0" dirty="0" smtClean="0">
+                          <a:solidFill>
+                            <a:srgbClr val="000000"/>
+                          </a:solidFill>
+                        </a:rPr>
                         <a:t> with </a:t>
                       </a:r>
                       <a:r>
-                        <a:rPr lang="en-US" sz="2000" dirty="0" smtClean="0"/>
+                        <a:rPr lang="en-US" sz="2000" dirty="0" smtClean="0">
+                          <a:solidFill>
+                            <a:srgbClr val="000000"/>
+                          </a:solidFill>
+                        </a:rPr>
                         <a:t>SignalR</a:t>
                       </a:r>
-                      <a:endParaRPr lang="en-US" sz="2000" dirty="0"/>
                     </a:p>
                   </a:txBody>
                   <a:tcPr marL="45720" marR="45720"/>
@@ -18917,10 +19479,18 @@
                     <a:lstStyle/>
                     <a:p>
                       <a:r>
-                        <a:rPr lang="en-US" sz="2000" dirty="0" smtClean="0"/>
+                        <a:rPr lang="en-US" sz="2000" dirty="0" smtClean="0">
+                          <a:solidFill>
+                            <a:srgbClr val="000000"/>
+                          </a:solidFill>
+                        </a:rPr>
                         <a:t>3:30</a:t>
                       </a:r>
-                      <a:endParaRPr lang="en-US" sz="2000" dirty="0"/>
+                      <a:endParaRPr lang="en-US" sz="2000" dirty="0">
+                        <a:solidFill>
+                          <a:srgbClr val="000000"/>
+                        </a:solidFill>
+                      </a:endParaRPr>
                     </a:p>
                   </a:txBody>
                   <a:tcPr marL="45720" marR="45720"/>
@@ -18931,14 +19501,27 @@
                     <a:lstStyle/>
                     <a:p>
                       <a:r>
-                        <a:rPr lang="en-US" sz="2000" dirty="0" smtClean="0"/>
-                        <a:t>4:30</a:t>
+                        <a:rPr lang="en-US" sz="2000" dirty="0" smtClean="0">
+                          <a:solidFill>
+                            <a:srgbClr val="000000"/>
+                          </a:solidFill>
+                        </a:rPr>
+                        <a:t>4:00</a:t>
                       </a:r>
-                      <a:endParaRPr lang="en-US" sz="2000" dirty="0"/>
+                      <a:endParaRPr lang="en-US" sz="2000" dirty="0">
+                        <a:solidFill>
+                          <a:srgbClr val="000000"/>
+                        </a:solidFill>
+                      </a:endParaRPr>
                     </a:p>
                   </a:txBody>
                   <a:tcPr marL="45720" marR="45720"/>
                 </a:tc>
+                <a:extLst>
+                  <a:ext uri="{0D108BD9-81ED-4DB2-BD59-A6C34878D82A}">
+                    <a16:rowId xmlns:a16="http://schemas.microsoft.com/office/drawing/2014/main" val="10010"/>
+                  </a:ext>
+                </a:extLst>
               </a:tr>
               <a:tr h="409188">
                 <a:tc>
@@ -18947,14 +19530,13 @@
                     <a:lstStyle/>
                     <a:p>
                       <a:r>
-                        <a:rPr lang="en-US" sz="2000" dirty="0" smtClean="0"/>
-                        <a:t>Wrap</a:t>
+                        <a:rPr lang="en-US" sz="2000" dirty="0" smtClean="0">
+                          <a:solidFill>
+                            <a:srgbClr val="000000"/>
+                          </a:solidFill>
+                        </a:rPr>
+                        <a:t>ASP.NET 5 Preview</a:t>
                       </a:r>
-                      <a:r>
-                        <a:rPr lang="en-US" sz="2000" baseline="0" dirty="0" smtClean="0"/>
-                        <a:t> Up</a:t>
-                      </a:r>
-                      <a:endParaRPr lang="en-US" sz="2000" dirty="0"/>
                     </a:p>
                   </a:txBody>
                   <a:tcPr marL="45720" marR="45720"/>
@@ -18965,10 +19547,18 @@
                     <a:lstStyle/>
                     <a:p>
                       <a:r>
-                        <a:rPr lang="en-US" sz="2000" dirty="0" smtClean="0"/>
-                        <a:t>4:30</a:t>
+                        <a:rPr lang="en-US" sz="2000" dirty="0" smtClean="0">
+                          <a:solidFill>
+                            <a:srgbClr val="000000"/>
+                          </a:solidFill>
+                        </a:rPr>
+                        <a:t>4:00</a:t>
                       </a:r>
-                      <a:endParaRPr lang="en-US" sz="2000" dirty="0"/>
+                      <a:endParaRPr lang="en-US" sz="2000" dirty="0">
+                        <a:solidFill>
+                          <a:srgbClr val="000000"/>
+                        </a:solidFill>
+                      </a:endParaRPr>
                     </a:p>
                   </a:txBody>
                   <a:tcPr marL="45720" marR="45720"/>
@@ -18979,14 +19569,108 @@
                     <a:lstStyle/>
                     <a:p>
                       <a:r>
-                        <a:rPr lang="en-US" sz="2000" dirty="0" smtClean="0"/>
-                        <a:t>5:00</a:t>
+                        <a:rPr lang="en-US" sz="2000" dirty="0" smtClean="0">
+                          <a:solidFill>
+                            <a:srgbClr val="000000"/>
+                          </a:solidFill>
+                        </a:rPr>
+                        <a:t>4:45</a:t>
                       </a:r>
-                      <a:endParaRPr lang="en-US" sz="2000" dirty="0"/>
+                      <a:endParaRPr lang="en-US" sz="2000" dirty="0">
+                        <a:solidFill>
+                          <a:srgbClr val="000000"/>
+                        </a:solidFill>
+                      </a:endParaRPr>
                     </a:p>
                   </a:txBody>
                   <a:tcPr marL="45720" marR="45720"/>
                 </a:tc>
+                <a:extLst>
+                  <a:ext uri="{0D108BD9-81ED-4DB2-BD59-A6C34878D82A}">
+                    <a16:rowId xmlns:a16="http://schemas.microsoft.com/office/drawing/2014/main" val="4181698176"/>
+                  </a:ext>
+                </a:extLst>
+              </a:tr>
+              <a:tr h="409188">
+                <a:tc>
+                  <a:txBody>
+                    <a:bodyPr/>
+                    <a:lstStyle/>
+                    <a:p>
+                      <a:r>
+                        <a:rPr lang="en-US" sz="2000" dirty="0" smtClean="0">
+                          <a:solidFill>
+                            <a:srgbClr val="000000"/>
+                          </a:solidFill>
+                        </a:rPr>
+                        <a:t>Wrap</a:t>
+                      </a:r>
+                      <a:r>
+                        <a:rPr lang="en-US" sz="2000" baseline="0" dirty="0" smtClean="0">
+                          <a:solidFill>
+                            <a:srgbClr val="000000"/>
+                          </a:solidFill>
+                        </a:rPr>
+                        <a:t> Up</a:t>
+                      </a:r>
+                      <a:endParaRPr lang="en-US" sz="2000" dirty="0">
+                        <a:solidFill>
+                          <a:srgbClr val="000000"/>
+                        </a:solidFill>
+                      </a:endParaRPr>
+                    </a:p>
+                  </a:txBody>
+                  <a:tcPr marL="45720" marR="45720"/>
+                </a:tc>
+                <a:tc>
+                  <a:txBody>
+                    <a:bodyPr/>
+                    <a:lstStyle/>
+                    <a:p>
+                      <a:r>
+                        <a:rPr lang="en-US" sz="2000" dirty="0" smtClean="0">
+                          <a:solidFill>
+                            <a:srgbClr val="000000"/>
+                          </a:solidFill>
+                        </a:rPr>
+                        <a:t>4:45</a:t>
+                      </a:r>
+                      <a:endParaRPr lang="en-US" sz="2000" dirty="0">
+                        <a:solidFill>
+                          <a:srgbClr val="000000"/>
+                        </a:solidFill>
+                      </a:endParaRPr>
+                    </a:p>
+                  </a:txBody>
+                  <a:tcPr marL="45720" marR="45720"/>
+                </a:tc>
+                <a:tc>
+                  <a:txBody>
+                    <a:bodyPr/>
+                    <a:lstStyle/>
+                    <a:p>
+                      <a:r>
+                        <a:rPr lang="en-US" sz="2000" dirty="0" smtClean="0">
+                          <a:solidFill>
+                            <a:srgbClr val="000000"/>
+                          </a:solidFill>
+                        </a:rPr>
+                        <a:t>5:00</a:t>
+                      </a:r>
+                      <a:endParaRPr lang="en-US" sz="2000" dirty="0">
+                        <a:solidFill>
+                          <a:srgbClr val="000000"/>
+                        </a:solidFill>
+                      </a:endParaRPr>
+                    </a:p>
+                  </a:txBody>
+                  <a:tcPr marL="45720" marR="45720"/>
+                </a:tc>
+                <a:extLst>
+                  <a:ext uri="{0D108BD9-81ED-4DB2-BD59-A6C34878D82A}">
+                    <a16:rowId xmlns:a16="http://schemas.microsoft.com/office/drawing/2014/main" val="10011"/>
+                  </a:ext>
+                </a:extLst>
               </a:tr>
             </a:tbl>
           </a:graphicData>
@@ -18995,7 +19679,7 @@
     </p:spTree>
     <p:extLst>
       <p:ext uri="{BB962C8B-B14F-4D97-AF65-F5344CB8AC3E}">
-        <p14:creationId xmlns:p14="http://schemas.microsoft.com/office/powerpoint/2010/main" val="3096345815"/>
+        <p14:creationId xmlns:p14="http://schemas.microsoft.com/office/powerpoint/2010/main" val="396892791"/>
       </p:ext>
     </p:extLst>
   </p:cSld>

</xml_diff>